<commit_message>
Titel der einen Grarfik angepasst und Präsi auf den neusten Stand gebracht
</commit_message>
<xml_diff>
--- a/Präsentation Gruppe 2.pptx
+++ b/Präsentation Gruppe 2.pptx
@@ -122,6 +122,9 @@
     <p:ext uri="{EFAFB233-063F-42B5-8137-9DF3F51BA10A}">
       <p15:sldGuideLst xmlns:p15="http://schemas.microsoft.com/office/powerpoint/2012/main"/>
     </p:ext>
+    <p:ext uri="{2D200454-40CA-4A62-9FC3-DE9A4176ACB9}">
+      <p15:notesGuideLst xmlns:p15="http://schemas.microsoft.com/office/powerpoint/2012/main"/>
+    </p:ext>
   </p:extLst>
 </p:presentation>
 </file>
@@ -550,6 +553,90 @@
     <p:extLst>
       <p:ext uri="{BB962C8B-B14F-4D97-AF65-F5344CB8AC3E}">
         <p14:creationId xmlns:p14="http://schemas.microsoft.com/office/powerpoint/2010/main" val="3884121879"/>
+      </p:ext>
+    </p:extLst>
+  </p:cSld>
+  <p:clrMapOvr>
+    <a:masterClrMapping/>
+  </p:clrMapOvr>
+</p:notes>
+</file>
+
+<file path=ppt/notesSlides/notesSlide2.xml><?xml version="1.0" encoding="utf-8"?>
+<p:notes xmlns:a="http://schemas.openxmlformats.org/drawingml/2006/main" xmlns:r="http://schemas.openxmlformats.org/officeDocument/2006/relationships" xmlns:p="http://schemas.openxmlformats.org/presentationml/2006/main">
+  <p:cSld>
+    <p:spTree>
+      <p:nvGrpSpPr>
+        <p:cNvPr id="1" name=""/>
+        <p:cNvGrpSpPr/>
+        <p:nvPr/>
+      </p:nvGrpSpPr>
+      <p:grpSpPr>
+        <a:xfrm>
+          <a:off x="0" y="0"/>
+          <a:ext cx="0" cy="0"/>
+          <a:chOff x="0" y="0"/>
+          <a:chExt cx="0" cy="0"/>
+        </a:xfrm>
+      </p:grpSpPr>
+      <p:sp>
+        <p:nvSpPr>
+          <p:cNvPr id="2" name="Folienbildplatzhalter 1"/>
+          <p:cNvSpPr>
+            <a:spLocks noGrp="1" noRot="1" noChangeAspect="1"/>
+          </p:cNvSpPr>
+          <p:nvPr>
+            <p:ph type="sldImg"/>
+          </p:nvPr>
+        </p:nvSpPr>
+        <p:spPr/>
+      </p:sp>
+      <p:sp>
+        <p:nvSpPr>
+          <p:cNvPr id="3" name="Notizenplatzhalter 2"/>
+          <p:cNvSpPr>
+            <a:spLocks noGrp="1"/>
+          </p:cNvSpPr>
+          <p:nvPr>
+            <p:ph type="body" idx="1"/>
+          </p:nvPr>
+        </p:nvSpPr>
+        <p:spPr/>
+        <p:txBody>
+          <a:bodyPr/>
+          <a:lstStyle/>
+          <a:p>
+            <a:endParaRPr lang="de-DE" dirty="0"/>
+          </a:p>
+        </p:txBody>
+      </p:sp>
+      <p:sp>
+        <p:nvSpPr>
+          <p:cNvPr id="4" name="Foliennummernplatzhalter 3"/>
+          <p:cNvSpPr>
+            <a:spLocks noGrp="1"/>
+          </p:cNvSpPr>
+          <p:nvPr>
+            <p:ph type="sldNum" sz="quarter" idx="5"/>
+          </p:nvPr>
+        </p:nvSpPr>
+        <p:spPr/>
+        <p:txBody>
+          <a:bodyPr/>
+          <a:lstStyle/>
+          <a:p>
+            <a:fld id="{6620C3BC-38C1-43FE-B962-4441245910D1}" type="slidenum">
+              <a:rPr lang="de-DE" smtClean="0"/>
+              <a:t>4</a:t>
+            </a:fld>
+            <a:endParaRPr lang="de-DE"/>
+          </a:p>
+        </p:txBody>
+      </p:sp>
+    </p:spTree>
+    <p:extLst>
+      <p:ext uri="{BB962C8B-B14F-4D97-AF65-F5344CB8AC3E}">
+        <p14:creationId xmlns:p14="http://schemas.microsoft.com/office/powerpoint/2010/main" val="2781838"/>
       </p:ext>
     </p:extLst>
   </p:cSld>
@@ -3807,6 +3894,13 @@
               <a:rPr lang="de-DE" dirty="0"/>
               <a:t> Einführung in Data Science und maschinelles Lernen</a:t>
             </a:r>
+            <a:br>
+              <a:rPr lang="de-DE" dirty="0"/>
+            </a:br>
+            <a:r>
+              <a:rPr lang="de-DE" dirty="0"/>
+              <a:t>23.01.2024</a:t>
+            </a:r>
           </a:p>
         </p:txBody>
       </p:sp>
@@ -5152,7 +5246,7 @@
         <p:spPr/>
         <p:txBody>
           <a:bodyPr>
-            <a:normAutofit fontScale="25000" lnSpcReduction="20000"/>
+            <a:normAutofit fontScale="32500" lnSpcReduction="20000"/>
           </a:bodyPr>
           <a:lstStyle/>
           <a:p>
@@ -5160,76 +5254,55 @@
           </a:p>
           <a:p>
             <a:r>
-              <a:rPr lang="de-DE" dirty="0"/>
+              <a:rPr lang="de-DE" sz="4400" dirty="0"/>
               <a:t>Struktur</a:t>
             </a:r>
           </a:p>
           <a:p>
             <a:r>
-              <a:rPr lang="de-DE" dirty="0"/>
+              <a:rPr lang="de-DE" sz="4400" dirty="0"/>
               <a:t>Ihre Präsentation sollte grundsätzlich folgendem Aufbau folgen:</a:t>
             </a:r>
           </a:p>
           <a:p>
-            <a:endParaRPr lang="de-DE" dirty="0"/>
-          </a:p>
-          <a:p>
-            <a:r>
-              <a:rPr lang="de-DE" dirty="0"/>
+            <a:r>
+              <a:rPr lang="de-DE" sz="4400" dirty="0"/>
               <a:t>Titelfolie: Projektname, Gruppennummer, Namen des Projektteams, Datum und alle anderen relevanten Informationen.</a:t>
             </a:r>
           </a:p>
           <a:p>
-            <a:endParaRPr lang="de-DE" dirty="0"/>
-          </a:p>
-          <a:p>
-            <a:r>
-              <a:rPr lang="de-DE" dirty="0"/>
+            <a:r>
+              <a:rPr lang="de-DE" sz="4400" dirty="0"/>
               <a:t>Datensatzmerkmale: 2–3 Folien.</a:t>
             </a:r>
           </a:p>
           <a:p>
-            <a:endParaRPr lang="de-DE" dirty="0"/>
-          </a:p>
-          <a:p>
-            <a:r>
-              <a:rPr lang="de-DE" dirty="0"/>
+            <a:r>
+              <a:rPr lang="de-DE" sz="4400" dirty="0"/>
               <a:t>Basismodell: 1 Folie.</a:t>
             </a:r>
           </a:p>
           <a:p>
-            <a:endParaRPr lang="de-DE" dirty="0"/>
-          </a:p>
-          <a:p>
-            <a:r>
-              <a:rPr lang="de-DE" dirty="0"/>
+            <a:r>
+              <a:rPr lang="de-DE" sz="4400" dirty="0"/>
               <a:t>Modelldefinition und -bewertung: 2-3 Folien.</a:t>
             </a:r>
           </a:p>
           <a:p>
-            <a:endParaRPr lang="de-DE" dirty="0"/>
-          </a:p>
-          <a:p>
-            <a:r>
-              <a:rPr lang="de-DE" dirty="0"/>
+            <a:r>
+              <a:rPr lang="de-DE" sz="4400" dirty="0"/>
               <a:t>Ergebnisse: 1 Folie.</a:t>
             </a:r>
           </a:p>
           <a:p>
-            <a:endParaRPr lang="de-DE" dirty="0"/>
-          </a:p>
-          <a:p>
-            <a:r>
-              <a:rPr lang="de-DE" dirty="0"/>
+            <a:r>
+              <a:rPr lang="de-DE" sz="4400" dirty="0"/>
               <a:t>Herausforderungen und Fehler: 1 Folie.</a:t>
             </a:r>
           </a:p>
           <a:p>
-            <a:endParaRPr lang="de-DE" dirty="0"/>
-          </a:p>
-          <a:p>
-            <a:r>
-              <a:rPr lang="de-DE" dirty="0"/>
+            <a:r>
+              <a:rPr lang="de-DE" sz="4400" dirty="0"/>
               <a:t>Fragen und Antworten: Letzte Folie mit Angabe des Fragen-und-Antwort-Teils.</a:t>
             </a:r>
           </a:p>
@@ -5751,31 +5824,76 @@
           </a:p>
         </p:txBody>
       </p:sp>
-      <p:sp>
-        <p:nvSpPr>
-          <p:cNvPr id="3" name="Inhaltsplatzhalter 2">
+      <p:pic>
+        <p:nvPicPr>
+          <p:cNvPr id="5" name="Inhaltsplatzhalter 4">
             <a:extLst>
               <a:ext uri="{FF2B5EF4-FFF2-40B4-BE49-F238E27FC236}">
-                <a16:creationId xmlns:a16="http://schemas.microsoft.com/office/drawing/2014/main" id="{046180EB-BED6-8DE2-6199-2859478325D3}"/>
+                <a16:creationId xmlns:a16="http://schemas.microsoft.com/office/drawing/2014/main" id="{0BA37989-B998-8956-8C90-9D3BAA5A03F2}"/>
               </a:ext>
             </a:extLst>
           </p:cNvPr>
-          <p:cNvSpPr>
-            <a:spLocks noGrp="1"/>
-          </p:cNvSpPr>
+          <p:cNvPicPr>
+            <a:picLocks noGrp="1" noChangeAspect="1"/>
+          </p:cNvPicPr>
           <p:nvPr>
             <p:ph idx="1"/>
           </p:nvPr>
-        </p:nvSpPr>
-        <p:spPr/>
-        <p:txBody>
-          <a:bodyPr/>
-          <a:lstStyle/>
-          <a:p>
-            <a:endParaRPr lang="de-DE"/>
-          </a:p>
-        </p:txBody>
-      </p:sp>
+        </p:nvPicPr>
+        <p:blipFill>
+          <a:blip r:embed="rId3">
+            <a:extLst>
+              <a:ext uri="{28A0092B-C50C-407E-A947-70E740481C1C}">
+                <a14:useLocalDpi xmlns:a14="http://schemas.microsoft.com/office/drawing/2010/main" val="0"/>
+              </a:ext>
+            </a:extLst>
+          </a:blip>
+          <a:stretch>
+            <a:fillRect/>
+          </a:stretch>
+        </p:blipFill>
+        <p:spPr>
+          <a:xfrm>
+            <a:off x="266842" y="2366781"/>
+            <a:ext cx="5829158" cy="3989508"/>
+          </a:xfrm>
+        </p:spPr>
+      </p:pic>
+      <p:pic>
+        <p:nvPicPr>
+          <p:cNvPr id="7" name="Grafik 6">
+            <a:extLst>
+              <a:ext uri="{FF2B5EF4-FFF2-40B4-BE49-F238E27FC236}">
+                <a16:creationId xmlns:a16="http://schemas.microsoft.com/office/drawing/2014/main" id="{F793FED3-6CBC-7BC3-472B-7B5617D7F7BE}"/>
+              </a:ext>
+            </a:extLst>
+          </p:cNvPr>
+          <p:cNvPicPr>
+            <a:picLocks noChangeAspect="1"/>
+          </p:cNvPicPr>
+          <p:nvPr/>
+        </p:nvPicPr>
+        <p:blipFill>
+          <a:blip r:embed="rId4">
+            <a:extLst>
+              <a:ext uri="{28A0092B-C50C-407E-A947-70E740481C1C}">
+                <a14:useLocalDpi xmlns:a14="http://schemas.microsoft.com/office/drawing/2010/main" val="0"/>
+              </a:ext>
+            </a:extLst>
+          </a:blip>
+          <a:srcRect/>
+          <a:stretch/>
+        </p:blipFill>
+        <p:spPr>
+          <a:xfrm>
+            <a:off x="6230164" y="2366781"/>
+            <a:ext cx="5829156" cy="3989509"/>
+          </a:xfrm>
+          <a:prstGeom prst="rect">
+            <a:avLst/>
+          </a:prstGeom>
+        </p:spPr>
+      </p:pic>
     </p:spTree>
     <p:extLst>
       <p:ext uri="{BB962C8B-B14F-4D97-AF65-F5344CB8AC3E}">

</xml_diff>

<commit_message>
Nochmal die geänderte Ferien Grafik in die Präsi und speichern
</commit_message>
<xml_diff>
--- a/Präsentation Gruppe 2.pptx
+++ b/Präsentation Gruppe 2.pptx
@@ -5854,7 +5854,7 @@
         </p:blipFill>
         <p:spPr>
           <a:xfrm>
-            <a:off x="266842" y="2366781"/>
+            <a:off x="266842" y="2366782"/>
             <a:ext cx="5829158" cy="3989508"/>
           </a:xfrm>
         </p:spPr>
@@ -5886,8 +5886,8 @@
         </p:blipFill>
         <p:spPr>
           <a:xfrm>
-            <a:off x="6230164" y="2366781"/>
-            <a:ext cx="5829156" cy="3989509"/>
+            <a:off x="6096002" y="2366782"/>
+            <a:ext cx="5829156" cy="3989508"/>
           </a:xfrm>
           <a:prstGeom prst="rect">
             <a:avLst/>

</xml_diff>

<commit_message>
fertig mit den Aufgaben von 1_DatasetCharacteristics
und einfügen der Grafiken in die Präsentation
</commit_message>
<xml_diff>
--- a/Präsentation Gruppe 2.pptx
+++ b/Präsentation Gruppe 2.pptx
@@ -5,21 +5,22 @@
     <p:sldMasterId id="2147483675" r:id="rId1"/>
   </p:sldMasterIdLst>
   <p:notesMasterIdLst>
-    <p:notesMasterId r:id="rId14"/>
+    <p:notesMasterId r:id="rId15"/>
   </p:notesMasterIdLst>
   <p:sldIdLst>
     <p:sldId id="256" r:id="rId2"/>
     <p:sldId id="268" r:id="rId3"/>
     <p:sldId id="257" r:id="rId4"/>
-    <p:sldId id="258" r:id="rId5"/>
-    <p:sldId id="259" r:id="rId6"/>
-    <p:sldId id="262" r:id="rId7"/>
-    <p:sldId id="263" r:id="rId8"/>
-    <p:sldId id="260" r:id="rId9"/>
-    <p:sldId id="264" r:id="rId10"/>
-    <p:sldId id="265" r:id="rId11"/>
-    <p:sldId id="261" r:id="rId12"/>
-    <p:sldId id="267" r:id="rId13"/>
+    <p:sldId id="269" r:id="rId5"/>
+    <p:sldId id="258" r:id="rId6"/>
+    <p:sldId id="259" r:id="rId7"/>
+    <p:sldId id="262" r:id="rId8"/>
+    <p:sldId id="263" r:id="rId9"/>
+    <p:sldId id="260" r:id="rId10"/>
+    <p:sldId id="264" r:id="rId11"/>
+    <p:sldId id="265" r:id="rId12"/>
+    <p:sldId id="261" r:id="rId13"/>
+    <p:sldId id="267" r:id="rId14"/>
   </p:sldIdLst>
   <p:sldSz cx="12192000" cy="6858000"/>
   <p:notesSz cx="6858000" cy="9144000"/>
@@ -627,7 +628,7 @@
           <a:p>
             <a:fld id="{6620C3BC-38C1-43FE-B962-4441245910D1}" type="slidenum">
               <a:rPr lang="de-DE" smtClean="0"/>
-              <a:t>4</a:t>
+              <a:t>5</a:t>
             </a:fld>
             <a:endParaRPr lang="de-DE"/>
           </a:p>
@@ -3985,11 +3986,11 @@
           <a:p>
             <a:pPr marL="514350" indent="-514350">
               <a:buFont typeface="+mj-lt"/>
-              <a:buAutoNum type="alphaLcParenR" startAt="3"/>
+              <a:buAutoNum type="alphaLcParenR" startAt="2"/>
             </a:pPr>
             <a:r>
               <a:rPr lang="de-DE" dirty="0"/>
-              <a:t>MAPE je Warengruppe für den Zeitraum vom 1.8.2018 bis 30.7.2019</a:t>
+              <a:t>Darstellung der Loss-Funktionen für Trainings- und Validierungsdatensatz</a:t>
             </a:r>
           </a:p>
           <a:p>
@@ -4003,7 +4004,7 @@
     </p:spTree>
     <p:extLst>
       <p:ext uri="{BB962C8B-B14F-4D97-AF65-F5344CB8AC3E}">
-        <p14:creationId xmlns:p14="http://schemas.microsoft.com/office/powerpoint/2010/main" val="3953231130"/>
+        <p14:creationId xmlns:p14="http://schemas.microsoft.com/office/powerpoint/2010/main" val="1581731859"/>
       </p:ext>
     </p:extLst>
   </p:cSld>
@@ -4035,6 +4036,102 @@
           <p:cNvPr id="2" name="Titel 1">
             <a:extLst>
               <a:ext uri="{FF2B5EF4-FFF2-40B4-BE49-F238E27FC236}">
+                <a16:creationId xmlns:a16="http://schemas.microsoft.com/office/drawing/2014/main" id="{925338B6-1A89-75B3-28D9-BB71D0B6E999}"/>
+              </a:ext>
+            </a:extLst>
+          </p:cNvPr>
+          <p:cNvSpPr>
+            <a:spLocks noGrp="1"/>
+          </p:cNvSpPr>
+          <p:nvPr>
+            <p:ph type="title"/>
+          </p:nvPr>
+        </p:nvSpPr>
+        <p:spPr/>
+        <p:txBody>
+          <a:bodyPr/>
+          <a:lstStyle/>
+          <a:p>
+            <a:r>
+              <a:rPr lang="de-DE" dirty="0"/>
+              <a:t>Optimierung eines neuronalen Netzes:</a:t>
+            </a:r>
+          </a:p>
+        </p:txBody>
+      </p:sp>
+      <p:sp>
+        <p:nvSpPr>
+          <p:cNvPr id="3" name="Inhaltsplatzhalter 2">
+            <a:extLst>
+              <a:ext uri="{FF2B5EF4-FFF2-40B4-BE49-F238E27FC236}">
+                <a16:creationId xmlns:a16="http://schemas.microsoft.com/office/drawing/2014/main" id="{92BCCD00-C4DD-B23E-DA10-5A4D725B6C43}"/>
+              </a:ext>
+            </a:extLst>
+          </p:cNvPr>
+          <p:cNvSpPr>
+            <a:spLocks noGrp="1"/>
+          </p:cNvSpPr>
+          <p:nvPr>
+            <p:ph idx="1"/>
+          </p:nvPr>
+        </p:nvSpPr>
+        <p:spPr/>
+        <p:txBody>
+          <a:bodyPr/>
+          <a:lstStyle/>
+          <a:p>
+            <a:pPr marL="514350" indent="-514350">
+              <a:buFont typeface="+mj-lt"/>
+              <a:buAutoNum type="alphaLcParenR" startAt="3"/>
+            </a:pPr>
+            <a:r>
+              <a:rPr lang="de-DE" dirty="0"/>
+              <a:t>MAPE je Warengruppe für den Zeitraum vom 1.8.2018 bis 30.7.2019</a:t>
+            </a:r>
+          </a:p>
+          <a:p>
+            <a:pPr marL="0" indent="0">
+              <a:buNone/>
+            </a:pPr>
+            <a:endParaRPr lang="de-DE" dirty="0"/>
+          </a:p>
+        </p:txBody>
+      </p:sp>
+    </p:spTree>
+    <p:extLst>
+      <p:ext uri="{BB962C8B-B14F-4D97-AF65-F5344CB8AC3E}">
+        <p14:creationId xmlns:p14="http://schemas.microsoft.com/office/powerpoint/2010/main" val="3953231130"/>
+      </p:ext>
+    </p:extLst>
+  </p:cSld>
+  <p:clrMapOvr>
+    <a:masterClrMapping/>
+  </p:clrMapOvr>
+</p:sld>
+</file>
+
+<file path=ppt/slides/slide12.xml><?xml version="1.0" encoding="utf-8"?>
+<p:sld xmlns:a="http://schemas.openxmlformats.org/drawingml/2006/main" xmlns:r="http://schemas.openxmlformats.org/officeDocument/2006/relationships" xmlns:p="http://schemas.openxmlformats.org/presentationml/2006/main">
+  <p:cSld>
+    <p:spTree>
+      <p:nvGrpSpPr>
+        <p:cNvPr id="1" name=""/>
+        <p:cNvGrpSpPr/>
+        <p:nvPr/>
+      </p:nvGrpSpPr>
+      <p:grpSpPr>
+        <a:xfrm>
+          <a:off x="0" y="0"/>
+          <a:ext cx="0" cy="0"/>
+          <a:chOff x="0" y="0"/>
+          <a:chExt cx="0" cy="0"/>
+        </a:xfrm>
+      </p:grpSpPr>
+      <p:sp>
+        <p:nvSpPr>
+          <p:cNvPr id="2" name="Titel 1">
+            <a:extLst>
+              <a:ext uri="{FF2B5EF4-FFF2-40B4-BE49-F238E27FC236}">
                 <a16:creationId xmlns:a16="http://schemas.microsoft.com/office/drawing/2014/main" id="{E9E950F8-DB2E-D2F6-B79E-B0A851C2CBBD}"/>
               </a:ext>
             </a:extLst>
@@ -5178,7 +5275,7 @@
 </p:sld>
 </file>
 
-<file path=ppt/slides/slide12.xml><?xml version="1.0" encoding="utf-8"?>
+<file path=ppt/slides/slide13.xml><?xml version="1.0" encoding="utf-8"?>
 <p:sld xmlns:a="http://schemas.openxmlformats.org/drawingml/2006/main" xmlns:r="http://schemas.openxmlformats.org/officeDocument/2006/relationships" xmlns:p="http://schemas.openxmlformats.org/presentationml/2006/main">
   <p:cSld>
     <p:spTree>
@@ -5764,6 +5861,42 @@
           </a:p>
         </p:txBody>
       </p:sp>
+      <p:pic>
+        <p:nvPicPr>
+          <p:cNvPr id="5" name="Grafik 4">
+            <a:extLst>
+              <a:ext uri="{FF2B5EF4-FFF2-40B4-BE49-F238E27FC236}">
+                <a16:creationId xmlns:a16="http://schemas.microsoft.com/office/drawing/2014/main" id="{A0C8D432-EC38-01A8-CAAC-B3D7C5DB85F4}"/>
+              </a:ext>
+            </a:extLst>
+          </p:cNvPr>
+          <p:cNvPicPr>
+            <a:picLocks noChangeAspect="1"/>
+          </p:cNvPicPr>
+          <p:nvPr/>
+        </p:nvPicPr>
+        <p:blipFill>
+          <a:blip r:embed="rId2">
+            <a:extLst>
+              <a:ext uri="{28A0092B-C50C-407E-A947-70E740481C1C}">
+                <a14:useLocalDpi xmlns:a14="http://schemas.microsoft.com/office/drawing/2010/main" val="0"/>
+              </a:ext>
+            </a:extLst>
+          </a:blip>
+          <a:stretch>
+            <a:fillRect/>
+          </a:stretch>
+        </p:blipFill>
+        <p:spPr>
+          <a:xfrm>
+            <a:off x="5012078" y="2268769"/>
+            <a:ext cx="6282734" cy="4299940"/>
+          </a:xfrm>
+          <a:prstGeom prst="rect">
+            <a:avLst/>
+          </a:prstGeom>
+        </p:spPr>
+      </p:pic>
     </p:spTree>
     <p:extLst>
       <p:ext uri="{BB962C8B-B14F-4D97-AF65-F5344CB8AC3E}">
@@ -5778,6 +5911,99 @@
 </file>
 
 <file path=ppt/slides/slide4.xml><?xml version="1.0" encoding="utf-8"?>
+<p:sld xmlns:a="http://schemas.openxmlformats.org/drawingml/2006/main" xmlns:r="http://schemas.openxmlformats.org/officeDocument/2006/relationships" xmlns:p="http://schemas.openxmlformats.org/presentationml/2006/main">
+  <p:cSld>
+    <p:spTree>
+      <p:nvGrpSpPr>
+        <p:cNvPr id="1" name=""/>
+        <p:cNvGrpSpPr/>
+        <p:nvPr/>
+      </p:nvGrpSpPr>
+      <p:grpSpPr>
+        <a:xfrm>
+          <a:off x="0" y="0"/>
+          <a:ext cx="0" cy="0"/>
+          <a:chOff x="0" y="0"/>
+          <a:chExt cx="0" cy="0"/>
+        </a:xfrm>
+      </p:grpSpPr>
+      <p:sp>
+        <p:nvSpPr>
+          <p:cNvPr id="2" name="Titel 1">
+            <a:extLst>
+              <a:ext uri="{FF2B5EF4-FFF2-40B4-BE49-F238E27FC236}">
+                <a16:creationId xmlns:a16="http://schemas.microsoft.com/office/drawing/2014/main" id="{C6D29DFC-890F-8B97-F1EE-0E51C96885D4}"/>
+              </a:ext>
+            </a:extLst>
+          </p:cNvPr>
+          <p:cNvSpPr>
+            <a:spLocks noGrp="1"/>
+          </p:cNvSpPr>
+          <p:nvPr>
+            <p:ph type="title"/>
+          </p:nvPr>
+        </p:nvSpPr>
+        <p:spPr/>
+        <p:txBody>
+          <a:bodyPr/>
+          <a:lstStyle/>
+          <a:p>
+            <a:r>
+              <a:rPr lang="de-DE" dirty="0"/>
+              <a:t>Unsere selbsterstellten Variablen</a:t>
+            </a:r>
+          </a:p>
+        </p:txBody>
+      </p:sp>
+      <p:pic>
+        <p:nvPicPr>
+          <p:cNvPr id="5" name="Grafik 4">
+            <a:extLst>
+              <a:ext uri="{FF2B5EF4-FFF2-40B4-BE49-F238E27FC236}">
+                <a16:creationId xmlns:a16="http://schemas.microsoft.com/office/drawing/2014/main" id="{A0C8D432-EC38-01A8-CAAC-B3D7C5DB85F4}"/>
+              </a:ext>
+            </a:extLst>
+          </p:cNvPr>
+          <p:cNvPicPr>
+            <a:picLocks noChangeAspect="1"/>
+          </p:cNvPicPr>
+          <p:nvPr/>
+        </p:nvPicPr>
+        <p:blipFill>
+          <a:blip r:embed="rId2">
+            <a:extLst>
+              <a:ext uri="{28A0092B-C50C-407E-A947-70E740481C1C}">
+                <a14:useLocalDpi xmlns:a14="http://schemas.microsoft.com/office/drawing/2010/main" val="0"/>
+              </a:ext>
+            </a:extLst>
+          </a:blip>
+          <a:srcRect/>
+          <a:stretch/>
+        </p:blipFill>
+        <p:spPr>
+          <a:xfrm>
+            <a:off x="2954633" y="2268769"/>
+            <a:ext cx="6282733" cy="4299940"/>
+          </a:xfrm>
+          <a:prstGeom prst="rect">
+            <a:avLst/>
+          </a:prstGeom>
+        </p:spPr>
+      </p:pic>
+    </p:spTree>
+    <p:extLst>
+      <p:ext uri="{BB962C8B-B14F-4D97-AF65-F5344CB8AC3E}">
+        <p14:creationId xmlns:p14="http://schemas.microsoft.com/office/powerpoint/2010/main" val="2661919179"/>
+      </p:ext>
+    </p:extLst>
+  </p:cSld>
+  <p:clrMapOvr>
+    <a:masterClrMapping/>
+  </p:clrMapOvr>
+</p:sld>
+</file>
+
+<file path=ppt/slides/slide5.xml><?xml version="1.0" encoding="utf-8"?>
 <p:sld xmlns:a="http://schemas.openxmlformats.org/drawingml/2006/main" xmlns:r="http://schemas.openxmlformats.org/officeDocument/2006/relationships" xmlns:p="http://schemas.openxmlformats.org/presentationml/2006/main">
   <p:cSld>
     <p:spTree>
@@ -5907,96 +6133,6 @@
 </p:sld>
 </file>
 
-<file path=ppt/slides/slide5.xml><?xml version="1.0" encoding="utf-8"?>
-<p:sld xmlns:a="http://schemas.openxmlformats.org/drawingml/2006/main" xmlns:r="http://schemas.openxmlformats.org/officeDocument/2006/relationships" xmlns:p="http://schemas.openxmlformats.org/presentationml/2006/main">
-  <p:cSld>
-    <p:spTree>
-      <p:nvGrpSpPr>
-        <p:cNvPr id="1" name=""/>
-        <p:cNvGrpSpPr/>
-        <p:nvPr/>
-      </p:nvGrpSpPr>
-      <p:grpSpPr>
-        <a:xfrm>
-          <a:off x="0" y="0"/>
-          <a:ext cx="0" cy="0"/>
-          <a:chOff x="0" y="0"/>
-          <a:chExt cx="0" cy="0"/>
-        </a:xfrm>
-      </p:grpSpPr>
-      <p:sp>
-        <p:nvSpPr>
-          <p:cNvPr id="2" name="Titel 1">
-            <a:extLst>
-              <a:ext uri="{FF2B5EF4-FFF2-40B4-BE49-F238E27FC236}">
-                <a16:creationId xmlns:a16="http://schemas.microsoft.com/office/drawing/2014/main" id="{6B5C63FE-F101-02F2-D1A3-343FC9CFD71F}"/>
-              </a:ext>
-            </a:extLst>
-          </p:cNvPr>
-          <p:cNvSpPr>
-            <a:spLocks noGrp="1"/>
-          </p:cNvSpPr>
-          <p:nvPr>
-            <p:ph type="title"/>
-          </p:nvPr>
-        </p:nvSpPr>
-        <p:spPr/>
-        <p:txBody>
-          <a:bodyPr/>
-          <a:lstStyle/>
-          <a:p>
-            <a:r>
-              <a:rPr lang="de-DE" dirty="0"/>
-              <a:t>Optimierung eines linearen Modells („Baseline Modell“):</a:t>
-            </a:r>
-          </a:p>
-        </p:txBody>
-      </p:sp>
-      <p:sp>
-        <p:nvSpPr>
-          <p:cNvPr id="3" name="Inhaltsplatzhalter 2">
-            <a:extLst>
-              <a:ext uri="{FF2B5EF4-FFF2-40B4-BE49-F238E27FC236}">
-                <a16:creationId xmlns:a16="http://schemas.microsoft.com/office/drawing/2014/main" id="{776E0D2F-2868-ECD7-47D6-C9E54A0351E1}"/>
-              </a:ext>
-            </a:extLst>
-          </p:cNvPr>
-          <p:cNvSpPr>
-            <a:spLocks noGrp="1"/>
-          </p:cNvSpPr>
-          <p:nvPr>
-            <p:ph idx="1"/>
-          </p:nvPr>
-        </p:nvSpPr>
-        <p:spPr/>
-        <p:txBody>
-          <a:bodyPr/>
-          <a:lstStyle/>
-          <a:p>
-            <a:pPr marL="514350" indent="-514350">
-              <a:buFont typeface="+mj-lt"/>
-              <a:buAutoNum type="alphaLcParenR"/>
-            </a:pPr>
-            <a:r>
-              <a:rPr lang="de-DE" dirty="0"/>
-              <a:t> Modellgleichung:</a:t>
-            </a:r>
-          </a:p>
-        </p:txBody>
-      </p:sp>
-    </p:spTree>
-    <p:extLst>
-      <p:ext uri="{BB962C8B-B14F-4D97-AF65-F5344CB8AC3E}">
-        <p14:creationId xmlns:p14="http://schemas.microsoft.com/office/powerpoint/2010/main" val="597932820"/>
-      </p:ext>
-    </p:extLst>
-  </p:cSld>
-  <p:clrMapOvr>
-    <a:masterClrMapping/>
-  </p:clrMapOvr>
-</p:sld>
-</file>
-
 <file path=ppt/slides/slide6.xml><?xml version="1.0" encoding="utf-8"?>
 <p:sld xmlns:a="http://schemas.openxmlformats.org/drawingml/2006/main" xmlns:r="http://schemas.openxmlformats.org/officeDocument/2006/relationships" xmlns:p="http://schemas.openxmlformats.org/presentationml/2006/main">
   <p:cSld>
@@ -6065,27 +6201,55 @@
           <a:p>
             <a:pPr marL="514350" indent="-514350">
               <a:buFont typeface="+mj-lt"/>
-              <a:buAutoNum type="alphaLcParenR" startAt="2"/>
+              <a:buAutoNum type="alphaLcParenR"/>
             </a:pPr>
             <a:r>
               <a:rPr lang="de-DE" dirty="0"/>
-              <a:t> </a:t>
-            </a:r>
-            <a:r>
-              <a:rPr lang="de-DE" dirty="0" err="1"/>
-              <a:t>Adjusted</a:t>
-            </a:r>
-            <a:r>
-              <a:rPr lang="de-DE" dirty="0"/>
-              <a:t> r²:</a:t>
-            </a:r>
-          </a:p>
-        </p:txBody>
-      </p:sp>
+              <a:t> Modellgleichung:</a:t>
+            </a:r>
+          </a:p>
+        </p:txBody>
+      </p:sp>
+      <p:pic>
+        <p:nvPicPr>
+          <p:cNvPr id="5" name="Grafik 4">
+            <a:extLst>
+              <a:ext uri="{FF2B5EF4-FFF2-40B4-BE49-F238E27FC236}">
+                <a16:creationId xmlns:a16="http://schemas.microsoft.com/office/drawing/2014/main" id="{9523D6F7-A565-35A9-2EF7-5EC21CE8E8A2}"/>
+              </a:ext>
+            </a:extLst>
+          </p:cNvPr>
+          <p:cNvPicPr>
+            <a:picLocks noChangeAspect="1"/>
+          </p:cNvPicPr>
+          <p:nvPr/>
+        </p:nvPicPr>
+        <p:blipFill>
+          <a:blip r:embed="rId2">
+            <a:extLst>
+              <a:ext uri="{28A0092B-C50C-407E-A947-70E740481C1C}">
+                <a14:useLocalDpi xmlns:a14="http://schemas.microsoft.com/office/drawing/2010/main" val="0"/>
+              </a:ext>
+            </a:extLst>
+          </a:blip>
+          <a:stretch>
+            <a:fillRect/>
+          </a:stretch>
+        </p:blipFill>
+        <p:spPr>
+          <a:xfrm>
+            <a:off x="889861" y="3075586"/>
+            <a:ext cx="10412278" cy="3258005"/>
+          </a:xfrm>
+          <a:prstGeom prst="rect">
+            <a:avLst/>
+          </a:prstGeom>
+        </p:spPr>
+      </p:pic>
     </p:spTree>
     <p:extLst>
       <p:ext uri="{BB962C8B-B14F-4D97-AF65-F5344CB8AC3E}">
-        <p14:creationId xmlns:p14="http://schemas.microsoft.com/office/powerpoint/2010/main" val="2912599849"/>
+        <p14:creationId xmlns:p14="http://schemas.microsoft.com/office/powerpoint/2010/main" val="597932820"/>
       </p:ext>
     </p:extLst>
   </p:cSld>
@@ -6163,11 +6327,19 @@
           <a:p>
             <a:pPr marL="514350" indent="-514350">
               <a:buFont typeface="+mj-lt"/>
-              <a:buAutoNum type="alphaLcParenR" startAt="3"/>
+              <a:buAutoNum type="alphaLcParenR" startAt="2"/>
             </a:pPr>
             <a:r>
               <a:rPr lang="de-DE" dirty="0"/>
-              <a:t> MAPE für den Zeitraum vom 1.8.2018 bis 30.7.2019:</a:t>
+              <a:t> </a:t>
+            </a:r>
+            <a:r>
+              <a:rPr lang="de-DE" dirty="0" err="1"/>
+              <a:t>Adjusted</a:t>
+            </a:r>
+            <a:r>
+              <a:rPr lang="de-DE" dirty="0"/>
+              <a:t> r²:</a:t>
             </a:r>
           </a:p>
         </p:txBody>
@@ -6175,7 +6347,7 @@
     </p:spTree>
     <p:extLst>
       <p:ext uri="{BB962C8B-B14F-4D97-AF65-F5344CB8AC3E}">
-        <p14:creationId xmlns:p14="http://schemas.microsoft.com/office/powerpoint/2010/main" val="1283198544"/>
+        <p14:creationId xmlns:p14="http://schemas.microsoft.com/office/powerpoint/2010/main" val="2912599849"/>
       </p:ext>
     </p:extLst>
   </p:cSld>
@@ -6207,7 +6379,7 @@
           <p:cNvPr id="2" name="Titel 1">
             <a:extLst>
               <a:ext uri="{FF2B5EF4-FFF2-40B4-BE49-F238E27FC236}">
-                <a16:creationId xmlns:a16="http://schemas.microsoft.com/office/drawing/2014/main" id="{925338B6-1A89-75B3-28D9-BB71D0B6E999}"/>
+                <a16:creationId xmlns:a16="http://schemas.microsoft.com/office/drawing/2014/main" id="{6B5C63FE-F101-02F2-D1A3-343FC9CFD71F}"/>
               </a:ext>
             </a:extLst>
           </p:cNvPr>
@@ -6225,7 +6397,7 @@
           <a:p>
             <a:r>
               <a:rPr lang="de-DE" dirty="0"/>
-              <a:t>Optimierung eines neuronalen Netzes:</a:t>
+              <a:t>Optimierung eines linearen Modells („Baseline Modell“):</a:t>
             </a:r>
           </a:p>
         </p:txBody>
@@ -6235,7 +6407,7 @@
           <p:cNvPr id="3" name="Inhaltsplatzhalter 2">
             <a:extLst>
               <a:ext uri="{FF2B5EF4-FFF2-40B4-BE49-F238E27FC236}">
-                <a16:creationId xmlns:a16="http://schemas.microsoft.com/office/drawing/2014/main" id="{92BCCD00-C4DD-B23E-DA10-5A4D725B6C43}"/>
+                <a16:creationId xmlns:a16="http://schemas.microsoft.com/office/drawing/2014/main" id="{776E0D2F-2868-ECD7-47D6-C9E54A0351E1}"/>
               </a:ext>
             </a:extLst>
           </p:cNvPr>
@@ -6253,25 +6425,19 @@
           <a:p>
             <a:pPr marL="514350" indent="-514350">
               <a:buFont typeface="+mj-lt"/>
-              <a:buAutoNum type="alphaLcParenR"/>
+              <a:buAutoNum type="alphaLcParenR" startAt="3"/>
             </a:pPr>
             <a:r>
               <a:rPr lang="de-DE" dirty="0"/>
-              <a:t>Source Code der Definition des neuronalen Netzes</a:t>
-            </a:r>
-          </a:p>
-          <a:p>
-            <a:pPr marL="0" indent="0">
-              <a:buNone/>
-            </a:pPr>
-            <a:endParaRPr lang="de-DE" dirty="0"/>
+              <a:t> MAPE für den Zeitraum vom 1.8.2018 bis 30.7.2019:</a:t>
+            </a:r>
           </a:p>
         </p:txBody>
       </p:sp>
     </p:spTree>
     <p:extLst>
       <p:ext uri="{BB962C8B-B14F-4D97-AF65-F5344CB8AC3E}">
-        <p14:creationId xmlns:p14="http://schemas.microsoft.com/office/powerpoint/2010/main" val="150230274"/>
+        <p14:creationId xmlns:p14="http://schemas.microsoft.com/office/powerpoint/2010/main" val="1283198544"/>
       </p:ext>
     </p:extLst>
   </p:cSld>
@@ -6349,11 +6515,11 @@
           <a:p>
             <a:pPr marL="514350" indent="-514350">
               <a:buFont typeface="+mj-lt"/>
-              <a:buAutoNum type="alphaLcParenR" startAt="2"/>
+              <a:buAutoNum type="alphaLcParenR"/>
             </a:pPr>
             <a:r>
               <a:rPr lang="de-DE" dirty="0"/>
-              <a:t>Darstellung der Loss-Funktionen für Trainings- und Validierungsdatensatz</a:t>
+              <a:t>Source Code der Definition des neuronalen Netzes</a:t>
             </a:r>
           </a:p>
           <a:p>
@@ -6367,7 +6533,7 @@
     </p:spTree>
     <p:extLst>
       <p:ext uri="{BB962C8B-B14F-4D97-AF65-F5344CB8AC3E}">
-        <p14:creationId xmlns:p14="http://schemas.microsoft.com/office/powerpoint/2010/main" val="1581731859"/>
+        <p14:creationId xmlns:p14="http://schemas.microsoft.com/office/powerpoint/2010/main" val="150230274"/>
       </p:ext>
     </p:extLst>
   </p:cSld>

</xml_diff>